<commit_message>
repaired photo error + added ppts
</commit_message>
<xml_diff>
--- a/PPT.pptx
+++ b/PPT.pptx
@@ -3114,7 +3114,7 @@
               </a:defRPr>
             </a:pPr>
             <a:r>
-              <a:t>Visual Perception</a:t>
+              <a:t>Machine Learning Revolution in the Technology Industry</a:t>
             </a:r>
           </a:p>
         </p:txBody>
@@ -3140,7 +3140,7 @@
               </a:defRPr>
             </a:pPr>
             <a:r>
-              <a:t>Visual perception is the process by which the brain interprets the information gathered by the eyes and gives it meaning.</a:t>
+              <a:t>Machine Learning has become a prominent technology in today's high-tech products.</a:t>
             </a:r>
           </a:p>
           <a:p>
@@ -3150,7 +3150,7 @@
               </a:defRPr>
             </a:pPr>
             <a:r>
-              <a:t>It involves the complex interplay between the eyes, the brain, and the environment.</a:t>
+              <a:t>Deep Learning has revolutionized the scientific community's perspective on ML techniques with its mind-blowing achievements.</a:t>
             </a:r>
           </a:p>
           <a:p>
@@ -3160,7 +3160,7 @@
               </a:defRPr>
             </a:pPr>
             <a:r>
-              <a:t>The different aspects of visual perception include depth perception, color perception, pattern recognition, visual memory, and visual attention.</a:t>
+              <a:t>The 2006 publication of how to train a deep neural network by Geoffrey Hinton et al. marked the beginning of the Machine Learning Tsunami.</a:t>
             </a:r>
           </a:p>
           <a:p>
@@ -3170,7 +3170,7 @@
               </a:defRPr>
             </a:pPr>
             <a:r>
-              <a:t>Visual illusions are a fascinating aspect of visual perception that demonstrate the brain's ability to interpret visual cues in unexpected ways.</a:t>
+              <a:t>Yann Lecun's deep convolutional neural networks pioneered the image recognition field since the 1990s.</a:t>
             </a:r>
           </a:p>
           <a:p>
@@ -3180,7 +3180,7 @@
               </a:defRPr>
             </a:pPr>
             <a:r>
-              <a:t>Deficits in visual perception, such as color blindness and visual agnosia, can have significant impacts on a person's daily life.</a:t>
+              <a:t>There is an increasing demand for experts in Machine Learning to join the industry.</a:t>
             </a:r>
           </a:p>
         </p:txBody>
@@ -3205,7 +3205,7 @@
       <p:grpSpPr/>
       <p:pic>
         <p:nvPicPr>
-          <p:cNvPr id="2" name="Picture 1" descr="maxresdefault.jpg"/>
+          <p:cNvPr id="2" name="Picture 1" descr="220px-AI-ML-DL.svg.png"/>
           <p:cNvPicPr>
             <a:picLocks noChangeAspect="1"/>
           </p:cNvPicPr>
@@ -3266,7 +3266,7 @@
               </a:defRPr>
             </a:pPr>
             <a:r>
-              <a:t>Perception of Depth in Visual Processing,</a:t>
+              <a:t>Introduction to Machine Learning Frameworks.</a:t>
             </a:r>
           </a:p>
         </p:txBody>
@@ -3292,7 +3292,7 @@
               </a:defRPr>
             </a:pPr>
             <a:r>
-              <a:t>Perception of depth in visual processing can be done through ordinal distance information and metric distance perception.</a:t>
+              <a:t>Scikit-Learn is an efficient and easy-to-use Python framework for implementing Machine Learning algorithms.</a:t>
             </a:r>
           </a:p>
           <a:p>
@@ -3302,7 +3302,7 @@
               </a:defRPr>
             </a:pPr>
             <a:r>
-              <a:t>Ordinal distance perception involves inferring the relative arrangement of visible objects to estimate depth perception.</a:t>
+              <a:t>The book covers various Machine Learning techniques, including the popular linear regression and some of the Deep Learning techniques.</a:t>
             </a:r>
           </a:p>
           <a:p>
@@ -3312,7 +3312,7 @@
               </a:defRPr>
             </a:pPr>
             <a:r>
-              <a:t>Metric distance perception provides a more accurate estimate of absolute distance for judging the distance between your eyes and objects in the environment.</a:t>
+              <a:t>You can apply Machine Learning to vast amount of data and discover hidden patterns, such as segmenting customers, detecting fraud, and recommending products.</a:t>
             </a:r>
           </a:p>
           <a:p>
@@ -3322,7 +3322,7 @@
               </a:defRPr>
             </a:pPr>
             <a:r>
-              <a:t>Perception of depth can occur through the occlusion of objects, where they appear closer if blocking a view of a farther object.</a:t>
+              <a:t>The book focuses on hands-on learning through practical examples and minimal theory.</a:t>
             </a:r>
           </a:p>
           <a:p>
@@ -3332,7 +3332,7 @@
               </a:defRPr>
             </a:pPr>
             <a:r>
-              <a:t>Through distance cues such as height in the visual field and binocular disparities, humans can accurately perceive the range of distances in the real world.</a:t>
+              <a:t>Distributed computations across multi-GPU servers enable the training and implementation of massive neural networks.</a:t>
             </a:r>
           </a:p>
         </p:txBody>
@@ -3357,7 +3357,7 @@
       <p:grpSpPr/>
       <p:pic>
         <p:nvPicPr>
-          <p:cNvPr id="2" name="Picture 1" descr="The_Brain_and_Visual_Processing_-_Occipital_Lobe_Infographic.png"/>
+          <p:cNvPr id="2" name="Picture 1" descr="41598_2020_67546_Fig1_HTML.png"/>
           <p:cNvPicPr>
             <a:picLocks noChangeAspect="1"/>
           </p:cNvPicPr>
@@ -3418,7 +3418,7 @@
               </a:defRPr>
             </a:pPr>
             <a:r>
-              <a:t>Monocular vs. Stereo Cues for Perception</a:t>
+              <a:t>Fundamentals of Machine Learning and Prerequisites</a:t>
             </a:r>
           </a:p>
         </p:txBody>
@@ -3444,7 +3444,7 @@
               </a:defRPr>
             </a:pPr>
             <a:r>
-              <a:t>A sensory cue is a piece of information derived from sensory stimulation that is useful for perception</a:t>
+              <a:t>Understanding college-level math is essential for those who want to understand the inner workings of machine learning.</a:t>
             </a:r>
           </a:p>
           <a:p>
@@ -3454,7 +3454,7 @@
               </a:defRPr>
             </a:pPr>
             <a:r>
-              <a:t>Depth cues obtained from photoreceptors or single eye movements are called monocular depth cues</a:t>
+              <a:t>Machine learning faces challenges such as underfitting and overfitting.</a:t>
             </a:r>
           </a:p>
           <a:p>
@@ -3464,7 +3464,7 @@
               </a:defRPr>
             </a:pPr>
             <a:r>
-              <a:t>Monocular cues are more abundant than stereo cues and can be used to extract depth information from a single photograph</a:t>
+              <a:t>Part I of the book covers the fundamentals of Machine Learning.</a:t>
             </a:r>
           </a:p>
           <a:p>
@@ -3474,7 +3474,7 @@
               </a:defRPr>
             </a:pPr>
             <a:r>
-              <a:t>Stereo depth cues require both eyes and involve the perception of depth through slight differences between the images the two eyes receive</a:t>
+              <a:t>The book assumes that readers have prior Python programming experience.</a:t>
             </a:r>
           </a:p>
           <a:p>
@@ -3484,7 +3484,7 @@
               </a:defRPr>
             </a:pPr>
             <a:r>
-              <a:t>Both monocular and stereo cues are used by humans and computer vision algorithms to perceive depth in the environment.</a:t>
+              <a:t>Familiarity with NumPy, Pandas, and Matplotlib, which are Python's main scientific libraries, is required.</a:t>
             </a:r>
           </a:p>
         </p:txBody>
@@ -3509,7 +3509,7 @@
       <p:grpSpPr/>
       <p:pic>
         <p:nvPicPr>
-          <p:cNvPr id="2" name="Picture 1" descr="img505.gif"/>
+          <p:cNvPr id="2" name="Picture 1" descr="hannah_fried.jpg"/>
           <p:cNvPicPr>
             <a:picLocks noChangeAspect="1"/>
           </p:cNvPicPr>

</xml_diff>